<commit_message>
Update plots and presentation
</commit_message>
<xml_diff>
--- a/presentation.pptx
+++ b/presentation.pptx
@@ -13,11 +13,15 @@
     <p:sldId id="264" r:id="rId7"/>
     <p:sldId id="258" r:id="rId8"/>
     <p:sldId id="259" r:id="rId9"/>
-    <p:sldId id="267" r:id="rId10"/>
-    <p:sldId id="260" r:id="rId11"/>
-    <p:sldId id="261" r:id="rId12"/>
-    <p:sldId id="269" r:id="rId13"/>
-    <p:sldId id="262" r:id="rId14"/>
+    <p:sldId id="271" r:id="rId10"/>
+    <p:sldId id="272" r:id="rId11"/>
+    <p:sldId id="273" r:id="rId12"/>
+    <p:sldId id="260" r:id="rId13"/>
+    <p:sldId id="261" r:id="rId14"/>
+    <p:sldId id="270" r:id="rId15"/>
+    <p:sldId id="274" r:id="rId16"/>
+    <p:sldId id="269" r:id="rId17"/>
+    <p:sldId id="262" r:id="rId18"/>
   </p:sldIdLst>
   <p:sldSz cx="12192000" cy="6858000"/>
   <p:notesSz cx="6858000" cy="9144000"/>
@@ -341,7 +345,7 @@
           <a:p>
             <a:fld id="{BA34DE39-8910-D246-A417-9A1ACFC10643}" type="datetimeFigureOut">
               <a:rPr lang="en-US" smtClean="0"/>
-              <a:t>7/23/22</a:t>
+              <a:t>7/27/22</a:t>
             </a:fld>
             <a:endParaRPr lang="en-US"/>
           </a:p>
@@ -635,7 +639,7 @@
           <a:p>
             <a:fld id="{BA34DE39-8910-D246-A417-9A1ACFC10643}" type="datetimeFigureOut">
               <a:rPr lang="en-US" smtClean="0"/>
-              <a:t>7/23/22</a:t>
+              <a:t>7/27/22</a:t>
             </a:fld>
             <a:endParaRPr lang="en-US"/>
           </a:p>
@@ -938,7 +942,7 @@
           <a:p>
             <a:fld id="{BA34DE39-8910-D246-A417-9A1ACFC10643}" type="datetimeFigureOut">
               <a:rPr lang="en-US" smtClean="0"/>
-              <a:t>7/23/22</a:t>
+              <a:t>7/27/22</a:t>
             </a:fld>
             <a:endParaRPr lang="en-US"/>
           </a:p>
@@ -1199,7 +1203,7 @@
           <a:p>
             <a:fld id="{BA34DE39-8910-D246-A417-9A1ACFC10643}" type="datetimeFigureOut">
               <a:rPr lang="en-US" smtClean="0"/>
-              <a:t>7/23/22</a:t>
+              <a:t>7/27/22</a:t>
             </a:fld>
             <a:endParaRPr lang="en-US"/>
           </a:p>
@@ -1566,7 +1570,7 @@
           <a:p>
             <a:fld id="{BA34DE39-8910-D246-A417-9A1ACFC10643}" type="datetimeFigureOut">
               <a:rPr lang="en-US" smtClean="0"/>
-              <a:t>7/23/22</a:t>
+              <a:t>7/27/22</a:t>
             </a:fld>
             <a:endParaRPr lang="en-US"/>
           </a:p>
@@ -1881,7 +1885,7 @@
           <a:p>
             <a:fld id="{BA34DE39-8910-D246-A417-9A1ACFC10643}" type="datetimeFigureOut">
               <a:rPr lang="en-US" smtClean="0"/>
-              <a:t>7/23/22</a:t>
+              <a:t>7/27/22</a:t>
             </a:fld>
             <a:endParaRPr lang="en-US"/>
           </a:p>
@@ -2426,7 +2430,7 @@
           <a:p>
             <a:fld id="{BA34DE39-8910-D246-A417-9A1ACFC10643}" type="datetimeFigureOut">
               <a:rPr lang="en-US" smtClean="0"/>
-              <a:t>7/23/22</a:t>
+              <a:t>7/27/22</a:t>
             </a:fld>
             <a:endParaRPr lang="en-US"/>
           </a:p>
@@ -2622,7 +2626,7 @@
           <a:p>
             <a:fld id="{BA34DE39-8910-D246-A417-9A1ACFC10643}" type="datetimeFigureOut">
               <a:rPr lang="en-US" smtClean="0"/>
-              <a:t>7/23/22</a:t>
+              <a:t>7/27/22</a:t>
             </a:fld>
             <a:endParaRPr lang="en-US"/>
           </a:p>
@@ -2836,7 +2840,7 @@
           <a:p>
             <a:fld id="{BA34DE39-8910-D246-A417-9A1ACFC10643}" type="datetimeFigureOut">
               <a:rPr lang="en-US" smtClean="0"/>
-              <a:t>7/23/22</a:t>
+              <a:t>7/27/22</a:t>
             </a:fld>
             <a:endParaRPr lang="en-US"/>
           </a:p>
@@ -3206,7 +3210,7 @@
           <a:p>
             <a:fld id="{BA34DE39-8910-D246-A417-9A1ACFC10643}" type="datetimeFigureOut">
               <a:rPr lang="en-US" smtClean="0"/>
-              <a:t>7/23/22</a:t>
+              <a:t>7/27/22</a:t>
             </a:fld>
             <a:endParaRPr lang="en-US"/>
           </a:p>
@@ -3610,7 +3614,7 @@
           <a:p>
             <a:fld id="{BA34DE39-8910-D246-A417-9A1ACFC10643}" type="datetimeFigureOut">
               <a:rPr lang="en-US" smtClean="0"/>
-              <a:t>7/23/22</a:t>
+              <a:t>7/27/22</a:t>
             </a:fld>
             <a:endParaRPr lang="en-US"/>
           </a:p>
@@ -3922,7 +3926,7 @@
           <a:p>
             <a:fld id="{BA34DE39-8910-D246-A417-9A1ACFC10643}" type="datetimeFigureOut">
               <a:rPr lang="en-US" smtClean="0"/>
-              <a:t>7/23/22</a:t>
+              <a:t>7/27/22</a:t>
             </a:fld>
             <a:endParaRPr lang="en-US"/>
           </a:p>
@@ -4574,56 +4578,24 @@
           <a:p>
             <a:r>
               <a:rPr lang="en-US" dirty="0"/>
-              <a:t>Conclusions</a:t>
-            </a:r>
-          </a:p>
-        </p:txBody>
-      </p:sp>
-      <p:sp>
-        <p:nvSpPr>
-          <p:cNvPr id="3" name="Content Placeholder 2">
+              <a:t>Results | ERD</a:t>
+            </a:r>
+            <a:br>
+              <a:rPr lang="en-US" dirty="0"/>
+            </a:br>
+            <a:r>
+              <a:rPr lang="en-US" sz="2400" dirty="0"/>
+              <a:t>S1 Hand, Electrode 27</a:t>
+            </a:r>
+          </a:p>
+        </p:txBody>
+      </p:sp>
+      <p:sp>
+        <p:nvSpPr>
+          <p:cNvPr id="7" name="TextBox 6">
             <a:extLst>
               <a:ext uri="{FF2B5EF4-FFF2-40B4-BE49-F238E27FC236}">
-                <a16:creationId xmlns:a16="http://schemas.microsoft.com/office/drawing/2014/main" id="{AA6B1422-D7D4-F653-7016-761FE0442ADA}"/>
-              </a:ext>
-            </a:extLst>
-          </p:cNvPr>
-          <p:cNvSpPr>
-            <a:spLocks noGrp="1"/>
-          </p:cNvSpPr>
-          <p:nvPr>
-            <p:ph idx="1"/>
-          </p:nvPr>
-        </p:nvSpPr>
-        <p:spPr/>
-        <p:txBody>
-          <a:bodyPr/>
-          <a:lstStyle/>
-          <a:p>
-            <a:r>
-              <a:rPr lang="en-US" dirty="0"/>
-              <a:t>which stats to demonstrate similarity between conditions?</a:t>
-            </a:r>
-          </a:p>
-          <a:p>
-            <a:r>
-              <a:rPr lang="en-US" dirty="0"/>
-              <a:t>motor planning? </a:t>
-            </a:r>
-            <a:r>
-              <a:rPr lang="en-US" dirty="0" err="1"/>
-              <a:t>Nakayashiki</a:t>
-            </a:r>
-            <a:endParaRPr lang="en-US" dirty="0"/>
-          </a:p>
-        </p:txBody>
-      </p:sp>
-      <p:sp>
-        <p:nvSpPr>
-          <p:cNvPr id="4" name="TextBox 3">
-            <a:extLst>
-              <a:ext uri="{FF2B5EF4-FFF2-40B4-BE49-F238E27FC236}">
-                <a16:creationId xmlns:a16="http://schemas.microsoft.com/office/drawing/2014/main" id="{83E40CE4-0C54-66F3-10EA-A0B36D205FC8}"/>
+                <a16:creationId xmlns:a16="http://schemas.microsoft.com/office/drawing/2014/main" id="{491C672F-5F1C-145B-D2AA-0489F3EE2464}"/>
               </a:ext>
             </a:extLst>
           </p:cNvPr>
@@ -4631,9 +4603,9 @@
           <p:nvPr/>
         </p:nvSpPr>
         <p:spPr>
-          <a:xfrm rot="19966124">
-            <a:off x="2197611" y="2969708"/>
-            <a:ext cx="7465326" cy="1446550"/>
+          <a:xfrm>
+            <a:off x="1145434" y="5809955"/>
+            <a:ext cx="9901131" cy="923330"/>
           </a:xfrm>
           <a:prstGeom prst="rect">
             <a:avLst/>
@@ -4648,16 +4620,73 @@
           <a:p>
             <a:pPr algn="ctr"/>
             <a:r>
-              <a:rPr lang="en-US" sz="8800" dirty="0"/>
-              <a:t>to be updated</a:t>
-            </a:r>
-          </a:p>
-        </p:txBody>
-      </p:sp>
+              <a:rPr lang="en-US" dirty="0"/>
+              <a:t>color (light -&gt; dark) indicates time course over epoch windows (-1000 to 3000 </a:t>
+            </a:r>
+            <a:r>
+              <a:rPr lang="en-US" dirty="0" err="1"/>
+              <a:t>ms</a:t>
+            </a:r>
+            <a:r>
+              <a:rPr lang="en-US" dirty="0"/>
+              <a:t>)</a:t>
+            </a:r>
+          </a:p>
+          <a:p>
+            <a:pPr algn="ctr"/>
+            <a:endParaRPr lang="en-US" dirty="0"/>
+          </a:p>
+          <a:p>
+            <a:pPr algn="ctr"/>
+            <a:r>
+              <a:rPr lang="en-US" dirty="0"/>
+              <a:t>vertical marker indicates 250 </a:t>
+            </a:r>
+            <a:r>
+              <a:rPr lang="en-US" dirty="0" err="1"/>
+              <a:t>ms</a:t>
+            </a:r>
+            <a:r>
+              <a:rPr lang="en-US" dirty="0"/>
+              <a:t> after onset of visual stimulus</a:t>
+            </a:r>
+          </a:p>
+        </p:txBody>
+      </p:sp>
+      <p:pic>
+        <p:nvPicPr>
+          <p:cNvPr id="4" name="Picture 3">
+            <a:extLst>
+              <a:ext uri="{FF2B5EF4-FFF2-40B4-BE49-F238E27FC236}">
+                <a16:creationId xmlns:a16="http://schemas.microsoft.com/office/drawing/2014/main" id="{57926E81-4CE1-0E31-149E-C8B96238E5E8}"/>
+              </a:ext>
+            </a:extLst>
+          </p:cNvPr>
+          <p:cNvPicPr>
+            <a:picLocks noChangeAspect="1"/>
+          </p:cNvPicPr>
+          <p:nvPr/>
+        </p:nvPicPr>
+        <p:blipFill>
+          <a:blip r:embed="rId2"/>
+          <a:stretch>
+            <a:fillRect/>
+          </a:stretch>
+        </p:blipFill>
+        <p:spPr>
+          <a:xfrm>
+            <a:off x="3352800" y="1600200"/>
+            <a:ext cx="5486400" cy="3657600"/>
+          </a:xfrm>
+          <a:prstGeom prst="rect">
+            <a:avLst/>
+          </a:prstGeom>
+        </p:spPr>
+      </p:pic>
     </p:spTree>
     <p:extLst>
       <p:ext uri="{BB962C8B-B14F-4D97-AF65-F5344CB8AC3E}">
-        <p14:creationId xmlns:p14="http://schemas.microsoft.com/office/powerpoint/2010/main" val="1981167294"/>
+        <p14:creationId xmlns:p14="http://schemas.microsoft.com/office/powerpoint/2010/main" val="1549780105"/>
       </p:ext>
     </p:extLst>
   </p:cSld>
@@ -4707,56 +4736,24 @@
           <a:p>
             <a:r>
               <a:rPr lang="en-US" dirty="0"/>
-              <a:t>Limitations</a:t>
-            </a:r>
-          </a:p>
-        </p:txBody>
-      </p:sp>
-      <p:sp>
-        <p:nvSpPr>
-          <p:cNvPr id="3" name="Content Placeholder 2">
+              <a:t>Results | ERD</a:t>
+            </a:r>
+            <a:br>
+              <a:rPr lang="en-US" dirty="0"/>
+            </a:br>
+            <a:r>
+              <a:rPr lang="en-US" sz="2400" dirty="0"/>
+              <a:t>S1 Hand, Electrode 27</a:t>
+            </a:r>
+          </a:p>
+        </p:txBody>
+      </p:sp>
+      <p:sp>
+        <p:nvSpPr>
+          <p:cNvPr id="7" name="TextBox 6">
             <a:extLst>
               <a:ext uri="{FF2B5EF4-FFF2-40B4-BE49-F238E27FC236}">
-                <a16:creationId xmlns:a16="http://schemas.microsoft.com/office/drawing/2014/main" id="{AA6B1422-D7D4-F653-7016-761FE0442ADA}"/>
-              </a:ext>
-            </a:extLst>
-          </p:cNvPr>
-          <p:cNvSpPr>
-            <a:spLocks noGrp="1"/>
-          </p:cNvSpPr>
-          <p:nvPr>
-            <p:ph idx="1"/>
-          </p:nvPr>
-        </p:nvSpPr>
-        <p:spPr/>
-        <p:txBody>
-          <a:bodyPr>
-            <a:normAutofit/>
-          </a:bodyPr>
-          <a:lstStyle/>
-          <a:p>
-            <a:r>
-              <a:rPr lang="en-US" dirty="0"/>
-              <a:t>time constraints (other analyses to perform? data cleaning?)</a:t>
-            </a:r>
-          </a:p>
-          <a:p>
-            <a:r>
-              <a:rPr lang="en-US" dirty="0"/>
-              <a:t>specific subject population reduces generalizability</a:t>
-            </a:r>
-          </a:p>
-          <a:p>
-            <a:endParaRPr lang="en-US" dirty="0"/>
-          </a:p>
-        </p:txBody>
-      </p:sp>
-      <p:sp>
-        <p:nvSpPr>
-          <p:cNvPr id="6" name="TextBox 5">
-            <a:extLst>
-              <a:ext uri="{FF2B5EF4-FFF2-40B4-BE49-F238E27FC236}">
-                <a16:creationId xmlns:a16="http://schemas.microsoft.com/office/drawing/2014/main" id="{22D2FEBB-3E31-C40C-84C5-59555F1970B4}"/>
+                <a16:creationId xmlns:a16="http://schemas.microsoft.com/office/drawing/2014/main" id="{491C672F-5F1C-145B-D2AA-0489F3EE2464}"/>
               </a:ext>
             </a:extLst>
           </p:cNvPr>
@@ -4764,9 +4761,9 @@
           <p:nvPr/>
         </p:nvSpPr>
         <p:spPr>
-          <a:xfrm rot="19966124">
-            <a:off x="2197611" y="2969708"/>
-            <a:ext cx="7465326" cy="1446550"/>
+          <a:xfrm>
+            <a:off x="1145434" y="5809955"/>
+            <a:ext cx="9901131" cy="923330"/>
           </a:xfrm>
           <a:prstGeom prst="rect">
             <a:avLst/>
@@ -4781,16 +4778,73 @@
           <a:p>
             <a:pPr algn="ctr"/>
             <a:r>
-              <a:rPr lang="en-US" sz="8800" dirty="0"/>
-              <a:t>to be updated</a:t>
-            </a:r>
-          </a:p>
-        </p:txBody>
-      </p:sp>
+              <a:rPr lang="en-US" dirty="0"/>
+              <a:t>color (light -&gt; dark) indicates time course over epoch windows (-1000 to 3000 </a:t>
+            </a:r>
+            <a:r>
+              <a:rPr lang="en-US" dirty="0" err="1"/>
+              <a:t>ms</a:t>
+            </a:r>
+            <a:r>
+              <a:rPr lang="en-US" dirty="0"/>
+              <a:t>)</a:t>
+            </a:r>
+          </a:p>
+          <a:p>
+            <a:pPr algn="ctr"/>
+            <a:endParaRPr lang="en-US" dirty="0"/>
+          </a:p>
+          <a:p>
+            <a:pPr algn="ctr"/>
+            <a:r>
+              <a:rPr lang="en-US" dirty="0"/>
+              <a:t>vertical marker indicates 250 </a:t>
+            </a:r>
+            <a:r>
+              <a:rPr lang="en-US" dirty="0" err="1"/>
+              <a:t>ms</a:t>
+            </a:r>
+            <a:r>
+              <a:rPr lang="en-US" dirty="0"/>
+              <a:t> after onset of visual stimulus</a:t>
+            </a:r>
+          </a:p>
+        </p:txBody>
+      </p:sp>
+      <p:pic>
+        <p:nvPicPr>
+          <p:cNvPr id="5" name="Picture 4">
+            <a:extLst>
+              <a:ext uri="{FF2B5EF4-FFF2-40B4-BE49-F238E27FC236}">
+                <a16:creationId xmlns:a16="http://schemas.microsoft.com/office/drawing/2014/main" id="{BF3CB207-3173-5F02-F7A8-C4CD65ACD695}"/>
+              </a:ext>
+            </a:extLst>
+          </p:cNvPr>
+          <p:cNvPicPr>
+            <a:picLocks noChangeAspect="1"/>
+          </p:cNvPicPr>
+          <p:nvPr/>
+        </p:nvPicPr>
+        <p:blipFill>
+          <a:blip r:embed="rId2"/>
+          <a:stretch>
+            <a:fillRect/>
+          </a:stretch>
+        </p:blipFill>
+        <p:spPr>
+          <a:xfrm>
+            <a:off x="3352800" y="1600200"/>
+            <a:ext cx="5486400" cy="3657600"/>
+          </a:xfrm>
+          <a:prstGeom prst="rect">
+            <a:avLst/>
+          </a:prstGeom>
+        </p:spPr>
+      </p:pic>
     </p:spTree>
     <p:extLst>
       <p:ext uri="{BB962C8B-B14F-4D97-AF65-F5344CB8AC3E}">
-        <p14:creationId xmlns:p14="http://schemas.microsoft.com/office/powerpoint/2010/main" val="116570967"/>
+        <p14:creationId xmlns:p14="http://schemas.microsoft.com/office/powerpoint/2010/main" val="3787470690"/>
       </p:ext>
     </p:extLst>
   </p:cSld>
@@ -4840,7 +4894,7 @@
           <a:p>
             <a:r>
               <a:rPr lang="en-US" dirty="0"/>
-              <a:t>References</a:t>
+              <a:t>Conclusions</a:t>
             </a:r>
           </a:p>
         </p:txBody>
@@ -4861,12 +4915,271 @@
             <p:ph idx="1"/>
           </p:nvPr>
         </p:nvSpPr>
-        <p:spPr>
-          <a:xfrm>
-            <a:off x="1498981" y="1751818"/>
-            <a:ext cx="9071158" cy="3997828"/>
-          </a:xfrm>
-        </p:spPr>
+        <p:spPr/>
+        <p:txBody>
+          <a:bodyPr/>
+          <a:lstStyle/>
+          <a:p>
+            <a:r>
+              <a:rPr lang="en-US" dirty="0"/>
+              <a:t>which stats to demonstrate similarity between conditions?</a:t>
+            </a:r>
+          </a:p>
+          <a:p>
+            <a:r>
+              <a:rPr lang="en-US" dirty="0"/>
+              <a:t>motor planning? </a:t>
+            </a:r>
+            <a:r>
+              <a:rPr lang="en-US" dirty="0" err="1"/>
+              <a:t>Nakayashiki</a:t>
+            </a:r>
+            <a:endParaRPr lang="en-US" dirty="0"/>
+          </a:p>
+        </p:txBody>
+      </p:sp>
+      <p:sp>
+        <p:nvSpPr>
+          <p:cNvPr id="4" name="TextBox 3">
+            <a:extLst>
+              <a:ext uri="{FF2B5EF4-FFF2-40B4-BE49-F238E27FC236}">
+                <a16:creationId xmlns:a16="http://schemas.microsoft.com/office/drawing/2014/main" id="{83E40CE4-0C54-66F3-10EA-A0B36D205FC8}"/>
+              </a:ext>
+            </a:extLst>
+          </p:cNvPr>
+          <p:cNvSpPr txBox="1"/>
+          <p:nvPr/>
+        </p:nvSpPr>
+        <p:spPr>
+          <a:xfrm rot="19966124">
+            <a:off x="2197611" y="2969708"/>
+            <a:ext cx="7465326" cy="1446550"/>
+          </a:xfrm>
+          <a:prstGeom prst="rect">
+            <a:avLst/>
+          </a:prstGeom>
+          <a:noFill/>
+        </p:spPr>
+        <p:txBody>
+          <a:bodyPr wrap="square" rtlCol="0">
+            <a:spAutoFit/>
+          </a:bodyPr>
+          <a:lstStyle/>
+          <a:p>
+            <a:pPr algn="ctr"/>
+            <a:r>
+              <a:rPr lang="en-US" sz="8800" dirty="0"/>
+              <a:t>to be updated</a:t>
+            </a:r>
+          </a:p>
+        </p:txBody>
+      </p:sp>
+    </p:spTree>
+    <p:extLst>
+      <p:ext uri="{BB962C8B-B14F-4D97-AF65-F5344CB8AC3E}">
+        <p14:creationId xmlns:p14="http://schemas.microsoft.com/office/powerpoint/2010/main" val="1981167294"/>
+      </p:ext>
+    </p:extLst>
+  </p:cSld>
+  <p:clrMapOvr>
+    <a:masterClrMapping/>
+  </p:clrMapOvr>
+</p:sld>
+</file>
+
+<file path=ppt/slides/slide13.xml><?xml version="1.0" encoding="utf-8"?>
+<p:sld xmlns:a="http://schemas.openxmlformats.org/drawingml/2006/main" xmlns:r="http://schemas.openxmlformats.org/officeDocument/2006/relationships" xmlns:p="http://schemas.openxmlformats.org/presentationml/2006/main">
+  <p:cSld>
+    <p:spTree>
+      <p:nvGrpSpPr>
+        <p:cNvPr id="1" name=""/>
+        <p:cNvGrpSpPr/>
+        <p:nvPr/>
+      </p:nvGrpSpPr>
+      <p:grpSpPr>
+        <a:xfrm>
+          <a:off x="0" y="0"/>
+          <a:ext cx="0" cy="0"/>
+          <a:chOff x="0" y="0"/>
+          <a:chExt cx="0" cy="0"/>
+        </a:xfrm>
+      </p:grpSpPr>
+      <p:sp>
+        <p:nvSpPr>
+          <p:cNvPr id="2" name="Title 1">
+            <a:extLst>
+              <a:ext uri="{FF2B5EF4-FFF2-40B4-BE49-F238E27FC236}">
+                <a16:creationId xmlns:a16="http://schemas.microsoft.com/office/drawing/2014/main" id="{AB229146-3FFE-7BBC-BD99-EA8A1D03F50B}"/>
+              </a:ext>
+            </a:extLst>
+          </p:cNvPr>
+          <p:cNvSpPr>
+            <a:spLocks noGrp="1"/>
+          </p:cNvSpPr>
+          <p:nvPr>
+            <p:ph type="title"/>
+          </p:nvPr>
+        </p:nvSpPr>
+        <p:spPr/>
+        <p:txBody>
+          <a:bodyPr/>
+          <a:lstStyle/>
+          <a:p>
+            <a:r>
+              <a:rPr lang="en-US" dirty="0"/>
+              <a:t>Limitations</a:t>
+            </a:r>
+          </a:p>
+        </p:txBody>
+      </p:sp>
+      <p:sp>
+        <p:nvSpPr>
+          <p:cNvPr id="3" name="Content Placeholder 2">
+            <a:extLst>
+              <a:ext uri="{FF2B5EF4-FFF2-40B4-BE49-F238E27FC236}">
+                <a16:creationId xmlns:a16="http://schemas.microsoft.com/office/drawing/2014/main" id="{AA6B1422-D7D4-F653-7016-761FE0442ADA}"/>
+              </a:ext>
+            </a:extLst>
+          </p:cNvPr>
+          <p:cNvSpPr>
+            <a:spLocks noGrp="1"/>
+          </p:cNvSpPr>
+          <p:nvPr>
+            <p:ph idx="1"/>
+          </p:nvPr>
+        </p:nvSpPr>
+        <p:spPr/>
+        <p:txBody>
+          <a:bodyPr>
+            <a:normAutofit lnSpcReduction="10000"/>
+          </a:bodyPr>
+          <a:lstStyle/>
+          <a:p>
+            <a:r>
+              <a:rPr lang="en-US" dirty="0"/>
+              <a:t>specific subject population reduces generalizability of findings</a:t>
+            </a:r>
+          </a:p>
+          <a:p>
+            <a:r>
+              <a:rPr lang="en-US" dirty="0"/>
+              <a:t>project time constraints led us to simplify our preprocessing:</a:t>
+            </a:r>
+          </a:p>
+          <a:p>
+            <a:pPr lvl="1"/>
+            <a:r>
+              <a:rPr lang="en-US" dirty="0"/>
+              <a:t>did not re-reference data to the average</a:t>
+            </a:r>
+          </a:p>
+          <a:p>
+            <a:pPr lvl="1"/>
+            <a:r>
+              <a:rPr lang="en-US" dirty="0"/>
+              <a:t>did not perform ICA or other methods to identify and remove noisy (or epileptic) epochs in the channels we analyzed</a:t>
+            </a:r>
+          </a:p>
+          <a:p>
+            <a:r>
+              <a:rPr lang="en-US" dirty="0"/>
+              <a:t>project time constraints led us to simplify our analyses:</a:t>
+            </a:r>
+          </a:p>
+          <a:p>
+            <a:pPr lvl="1"/>
+            <a:r>
+              <a:rPr lang="en-US" dirty="0"/>
+              <a:t>did not z-score across subjects before classification</a:t>
+            </a:r>
+          </a:p>
+          <a:p>
+            <a:pPr lvl="1"/>
+            <a:r>
+              <a:rPr lang="en-US" dirty="0"/>
+              <a:t>single randomized split for training/test (no thorough cross-validation)</a:t>
+            </a:r>
+          </a:p>
+          <a:p>
+            <a:endParaRPr lang="en-US" dirty="0"/>
+          </a:p>
+        </p:txBody>
+      </p:sp>
+    </p:spTree>
+    <p:extLst>
+      <p:ext uri="{BB962C8B-B14F-4D97-AF65-F5344CB8AC3E}">
+        <p14:creationId xmlns:p14="http://schemas.microsoft.com/office/powerpoint/2010/main" val="116570967"/>
+      </p:ext>
+    </p:extLst>
+  </p:cSld>
+  <p:clrMapOvr>
+    <a:masterClrMapping/>
+  </p:clrMapOvr>
+</p:sld>
+</file>
+
+<file path=ppt/slides/slide14.xml><?xml version="1.0" encoding="utf-8"?>
+<p:sld xmlns:a="http://schemas.openxmlformats.org/drawingml/2006/main" xmlns:r="http://schemas.openxmlformats.org/officeDocument/2006/relationships" xmlns:p="http://schemas.openxmlformats.org/presentationml/2006/main">
+  <p:cSld>
+    <p:spTree>
+      <p:nvGrpSpPr>
+        <p:cNvPr id="1" name=""/>
+        <p:cNvGrpSpPr/>
+        <p:nvPr/>
+      </p:nvGrpSpPr>
+      <p:grpSpPr>
+        <a:xfrm>
+          <a:off x="0" y="0"/>
+          <a:ext cx="0" cy="0"/>
+          <a:chOff x="0" y="0"/>
+          <a:chExt cx="0" cy="0"/>
+        </a:xfrm>
+      </p:grpSpPr>
+      <p:sp>
+        <p:nvSpPr>
+          <p:cNvPr id="2" name="Title 1">
+            <a:extLst>
+              <a:ext uri="{FF2B5EF4-FFF2-40B4-BE49-F238E27FC236}">
+                <a16:creationId xmlns:a16="http://schemas.microsoft.com/office/drawing/2014/main" id="{AB229146-3FFE-7BBC-BD99-EA8A1D03F50B}"/>
+              </a:ext>
+            </a:extLst>
+          </p:cNvPr>
+          <p:cNvSpPr>
+            <a:spLocks noGrp="1"/>
+          </p:cNvSpPr>
+          <p:nvPr>
+            <p:ph type="title"/>
+          </p:nvPr>
+        </p:nvSpPr>
+        <p:spPr/>
+        <p:txBody>
+          <a:bodyPr/>
+          <a:lstStyle/>
+          <a:p>
+            <a:r>
+              <a:rPr lang="en-US" dirty="0"/>
+              <a:t>Future Directions</a:t>
+            </a:r>
+          </a:p>
+        </p:txBody>
+      </p:sp>
+      <p:sp>
+        <p:nvSpPr>
+          <p:cNvPr id="3" name="Content Placeholder 2">
+            <a:extLst>
+              <a:ext uri="{FF2B5EF4-FFF2-40B4-BE49-F238E27FC236}">
+                <a16:creationId xmlns:a16="http://schemas.microsoft.com/office/drawing/2014/main" id="{AA6B1422-D7D4-F653-7016-761FE0442ADA}"/>
+              </a:ext>
+            </a:extLst>
+          </p:cNvPr>
+          <p:cNvSpPr>
+            <a:spLocks noGrp="1"/>
+          </p:cNvSpPr>
+          <p:nvPr>
+            <p:ph idx="1"/>
+          </p:nvPr>
+        </p:nvSpPr>
+        <p:spPr/>
         <p:txBody>
           <a:bodyPr>
             <a:normAutofit/>
@@ -4875,123 +5188,537 @@
           <a:p>
             <a:r>
               <a:rPr lang="en-US" dirty="0"/>
+              <a:t>what else would we do if we had more time?</a:t>
+            </a:r>
+          </a:p>
+          <a:p>
+            <a:endParaRPr lang="en-US" dirty="0"/>
+          </a:p>
+        </p:txBody>
+      </p:sp>
+    </p:spTree>
+    <p:extLst>
+      <p:ext uri="{BB962C8B-B14F-4D97-AF65-F5344CB8AC3E}">
+        <p14:creationId xmlns:p14="http://schemas.microsoft.com/office/powerpoint/2010/main" val="283554576"/>
+      </p:ext>
+    </p:extLst>
+  </p:cSld>
+  <p:clrMapOvr>
+    <a:masterClrMapping/>
+  </p:clrMapOvr>
+</p:sld>
+</file>
+
+<file path=ppt/slides/slide15.xml><?xml version="1.0" encoding="utf-8"?>
+<p:sld xmlns:a="http://schemas.openxmlformats.org/drawingml/2006/main" xmlns:r="http://schemas.openxmlformats.org/officeDocument/2006/relationships" xmlns:p="http://schemas.openxmlformats.org/presentationml/2006/main">
+  <p:cSld>
+    <p:spTree>
+      <p:nvGrpSpPr>
+        <p:cNvPr id="1" name=""/>
+        <p:cNvGrpSpPr/>
+        <p:nvPr/>
+      </p:nvGrpSpPr>
+      <p:grpSpPr>
+        <a:xfrm>
+          <a:off x="0" y="0"/>
+          <a:ext cx="0" cy="0"/>
+          <a:chOff x="0" y="0"/>
+          <a:chExt cx="0" cy="0"/>
+        </a:xfrm>
+      </p:grpSpPr>
+      <p:sp>
+        <p:nvSpPr>
+          <p:cNvPr id="2" name="Title 1">
+            <a:extLst>
+              <a:ext uri="{FF2B5EF4-FFF2-40B4-BE49-F238E27FC236}">
+                <a16:creationId xmlns:a16="http://schemas.microsoft.com/office/drawing/2014/main" id="{AB229146-3FFE-7BBC-BD99-EA8A1D03F50B}"/>
+              </a:ext>
+            </a:extLst>
+          </p:cNvPr>
+          <p:cNvSpPr>
+            <a:spLocks noGrp="1"/>
+          </p:cNvSpPr>
+          <p:nvPr>
+            <p:ph type="title"/>
+          </p:nvPr>
+        </p:nvSpPr>
+        <p:spPr/>
+        <p:txBody>
+          <a:bodyPr/>
+          <a:lstStyle/>
+          <a:p>
+            <a:r>
+              <a:rPr lang="en-US" dirty="0"/>
+              <a:t>Code Availability</a:t>
+            </a:r>
+          </a:p>
+        </p:txBody>
+      </p:sp>
+      <p:sp>
+        <p:nvSpPr>
+          <p:cNvPr id="3" name="Content Placeholder 2">
+            <a:extLst>
+              <a:ext uri="{FF2B5EF4-FFF2-40B4-BE49-F238E27FC236}">
+                <a16:creationId xmlns:a16="http://schemas.microsoft.com/office/drawing/2014/main" id="{AA6B1422-D7D4-F653-7016-761FE0442ADA}"/>
+              </a:ext>
+            </a:extLst>
+          </p:cNvPr>
+          <p:cNvSpPr>
+            <a:spLocks noGrp="1"/>
+          </p:cNvSpPr>
+          <p:nvPr>
+            <p:ph idx="1"/>
+          </p:nvPr>
+        </p:nvSpPr>
+        <p:spPr>
+          <a:xfrm>
+            <a:off x="1498980" y="1751818"/>
+            <a:ext cx="9487467" cy="3997828"/>
+          </a:xfrm>
+        </p:spPr>
+        <p:txBody>
+          <a:bodyPr>
+            <a:normAutofit/>
+          </a:bodyPr>
+          <a:lstStyle/>
+          <a:p>
+            <a:pPr marL="0" indent="0" algn="ctr">
+              <a:buNone/>
+            </a:pPr>
+            <a:r>
+              <a:rPr lang="en-US" sz="4000" dirty="0"/>
+              <a:t>https://</a:t>
+            </a:r>
+            <a:r>
+              <a:rPr lang="en-US" sz="4000" dirty="0" err="1"/>
+              <a:t>github.com</a:t>
+            </a:r>
+            <a:r>
+              <a:rPr lang="en-US" sz="4000" dirty="0"/>
+              <a:t>/jessb0t/</a:t>
+            </a:r>
+            <a:r>
+              <a:rPr lang="en-US" sz="4000" dirty="0" err="1"/>
+              <a:t>motorImagery</a:t>
+            </a:r>
+            <a:endParaRPr lang="en-US" sz="4000" dirty="0"/>
+          </a:p>
+        </p:txBody>
+      </p:sp>
+    </p:spTree>
+    <p:extLst>
+      <p:ext uri="{BB962C8B-B14F-4D97-AF65-F5344CB8AC3E}">
+        <p14:creationId xmlns:p14="http://schemas.microsoft.com/office/powerpoint/2010/main" val="279706596"/>
+      </p:ext>
+    </p:extLst>
+  </p:cSld>
+  <p:clrMapOvr>
+    <a:masterClrMapping/>
+  </p:clrMapOvr>
+</p:sld>
+</file>
+
+<file path=ppt/slides/slide16.xml><?xml version="1.0" encoding="utf-8"?>
+<p:sld xmlns:a="http://schemas.openxmlformats.org/drawingml/2006/main" xmlns:r="http://schemas.openxmlformats.org/officeDocument/2006/relationships" xmlns:p="http://schemas.openxmlformats.org/presentationml/2006/main">
+  <p:cSld>
+    <p:spTree>
+      <p:nvGrpSpPr>
+        <p:cNvPr id="1" name=""/>
+        <p:cNvGrpSpPr/>
+        <p:nvPr/>
+      </p:nvGrpSpPr>
+      <p:grpSpPr>
+        <a:xfrm>
+          <a:off x="0" y="0"/>
+          <a:ext cx="0" cy="0"/>
+          <a:chOff x="0" y="0"/>
+          <a:chExt cx="0" cy="0"/>
+        </a:xfrm>
+      </p:grpSpPr>
+      <p:sp>
+        <p:nvSpPr>
+          <p:cNvPr id="2" name="Title 1">
+            <a:extLst>
+              <a:ext uri="{FF2B5EF4-FFF2-40B4-BE49-F238E27FC236}">
+                <a16:creationId xmlns:a16="http://schemas.microsoft.com/office/drawing/2014/main" id="{AB229146-3FFE-7BBC-BD99-EA8A1D03F50B}"/>
+              </a:ext>
+            </a:extLst>
+          </p:cNvPr>
+          <p:cNvSpPr>
+            <a:spLocks noGrp="1"/>
+          </p:cNvSpPr>
+          <p:nvPr>
+            <p:ph type="title"/>
+          </p:nvPr>
+        </p:nvSpPr>
+        <p:spPr/>
+        <p:txBody>
+          <a:bodyPr/>
+          <a:lstStyle/>
+          <a:p>
+            <a:r>
+              <a:rPr lang="en-US" dirty="0"/>
+              <a:t>References</a:t>
+            </a:r>
+          </a:p>
+        </p:txBody>
+      </p:sp>
+      <p:sp>
+        <p:nvSpPr>
+          <p:cNvPr id="3" name="Content Placeholder 2">
+            <a:extLst>
+              <a:ext uri="{FF2B5EF4-FFF2-40B4-BE49-F238E27FC236}">
+                <a16:creationId xmlns:a16="http://schemas.microsoft.com/office/drawing/2014/main" id="{AA6B1422-D7D4-F653-7016-761FE0442ADA}"/>
+              </a:ext>
+            </a:extLst>
+          </p:cNvPr>
+          <p:cNvSpPr>
+            <a:spLocks noGrp="1"/>
+          </p:cNvSpPr>
+          <p:nvPr>
+            <p:ph idx="1"/>
+          </p:nvPr>
+        </p:nvSpPr>
+        <p:spPr>
+          <a:xfrm>
+            <a:off x="1498980" y="1751818"/>
+            <a:ext cx="9378285" cy="4519802"/>
+          </a:xfrm>
+        </p:spPr>
+        <p:txBody>
+          <a:bodyPr>
+            <a:noAutofit/>
+          </a:bodyPr>
+          <a:lstStyle/>
+          <a:p>
+            <a:pPr>
+              <a:spcBef>
+                <a:spcPts val="400"/>
+              </a:spcBef>
+              <a:spcAft>
+                <a:spcPts val="400"/>
+              </a:spcAft>
+            </a:pPr>
+            <a:r>
+              <a:rPr lang="en-US" sz="1400" dirty="0" err="1"/>
+              <a:t>Gramfort</a:t>
+            </a:r>
+            <a:r>
+              <a:rPr lang="en-US" sz="1400" dirty="0"/>
+              <a:t>, A., </a:t>
+            </a:r>
+            <a:r>
+              <a:rPr lang="en-US" sz="1400" dirty="0" err="1"/>
+              <a:t>Luessi</a:t>
+            </a:r>
+            <a:r>
+              <a:rPr lang="en-US" sz="1400" dirty="0"/>
+              <a:t>, M., Larson, E., </a:t>
+            </a:r>
+            <a:r>
+              <a:rPr lang="en-US" sz="1400" dirty="0" err="1"/>
+              <a:t>Engemann</a:t>
+            </a:r>
+            <a:r>
+              <a:rPr lang="en-US" sz="1400" dirty="0"/>
+              <a:t>, D. A., </a:t>
+            </a:r>
+            <a:r>
+              <a:rPr lang="en-US" sz="1400" dirty="0" err="1"/>
+              <a:t>Strohmeier</a:t>
+            </a:r>
+            <a:r>
+              <a:rPr lang="en-US" sz="1400" dirty="0"/>
+              <a:t>, D., </a:t>
+            </a:r>
+            <a:r>
+              <a:rPr lang="en-US" sz="1400" dirty="0" err="1"/>
+              <a:t>Brodbeck</a:t>
+            </a:r>
+            <a:r>
+              <a:rPr lang="en-US" sz="1400" dirty="0"/>
+              <a:t>, C., </a:t>
+            </a:r>
+            <a:r>
+              <a:rPr lang="en-US" sz="1400" dirty="0" err="1"/>
+              <a:t>Goj</a:t>
+            </a:r>
+            <a:r>
+              <a:rPr lang="en-US" sz="1400" dirty="0"/>
+              <a:t>, R., Jas, M., Brooks, T., </a:t>
+            </a:r>
+            <a:r>
+              <a:rPr lang="en-US" sz="1400" dirty="0" err="1"/>
+              <a:t>Parkkonen</a:t>
+            </a:r>
+            <a:r>
+              <a:rPr lang="en-US" sz="1400" dirty="0"/>
+              <a:t>, L., &amp; </a:t>
+            </a:r>
+            <a:r>
+              <a:rPr lang="en-US" sz="1400" dirty="0" err="1"/>
+              <a:t>Hämäläinen</a:t>
+            </a:r>
+            <a:r>
+              <a:rPr lang="en-US" sz="1400" dirty="0"/>
+              <a:t>, M. S. (2013). MEG and EEG data analysis with MNE-Python. </a:t>
+            </a:r>
+            <a:r>
+              <a:rPr lang="en-US" sz="1400" i="1" dirty="0"/>
+              <a:t>Frontiers in Neuroscience</a:t>
+            </a:r>
+            <a:r>
+              <a:rPr lang="en-US" sz="1400" dirty="0"/>
+              <a:t>, 7(267):1–13.</a:t>
+            </a:r>
+          </a:p>
+          <a:p>
+            <a:pPr>
+              <a:spcBef>
+                <a:spcPts val="400"/>
+              </a:spcBef>
+              <a:spcAft>
+                <a:spcPts val="400"/>
+              </a:spcAft>
+            </a:pPr>
+            <a:r>
+              <a:rPr lang="en-US" sz="1400" dirty="0"/>
+              <a:t>Harris, C.R., Millman, K.J., van der Walt, S.J. et al. (2020). Array programming with NumPy. </a:t>
+            </a:r>
+            <a:r>
+              <a:rPr lang="en-US" sz="1400" i="1" dirty="0"/>
+              <a:t>Nature</a:t>
+            </a:r>
+            <a:r>
+              <a:rPr lang="en-US" sz="1400" dirty="0"/>
+              <a:t> 585, 357–362.</a:t>
+            </a:r>
+          </a:p>
+          <a:p>
+            <a:pPr>
+              <a:spcBef>
+                <a:spcPts val="400"/>
+              </a:spcBef>
+              <a:spcAft>
+                <a:spcPts val="400"/>
+              </a:spcAft>
+            </a:pPr>
+            <a:r>
+              <a:rPr lang="en-US" sz="1400" dirty="0"/>
+              <a:t>Hunter, J.D. (2007). Matplotlib: A 2D Graphics Environment, </a:t>
+            </a:r>
+            <a:r>
+              <a:rPr lang="en-US" sz="1400" i="1" dirty="0"/>
+              <a:t>Computing in Science &amp; Engineering</a:t>
+            </a:r>
+            <a:r>
+              <a:rPr lang="en-US" sz="1400" dirty="0"/>
+              <a:t>, 9(3):90-95.</a:t>
+            </a:r>
+          </a:p>
+          <a:p>
+            <a:pPr>
+              <a:spcBef>
+                <a:spcPts val="400"/>
+              </a:spcBef>
+              <a:spcAft>
+                <a:spcPts val="400"/>
+              </a:spcAft>
+            </a:pPr>
+            <a:r>
+              <a:rPr lang="en-US" sz="1400" dirty="0"/>
               <a:t>Miller, K. J., Schalk, G., </a:t>
             </a:r>
             <a:r>
-              <a:rPr lang="en-US" dirty="0" err="1"/>
+              <a:rPr lang="en-US" sz="1400" dirty="0" err="1"/>
               <a:t>Fetz</a:t>
             </a:r>
             <a:r>
-              <a:rPr lang="en-US" dirty="0"/>
+              <a:rPr lang="en-US" sz="1400" dirty="0"/>
               <a:t>, E. E., den </a:t>
             </a:r>
             <a:r>
-              <a:rPr lang="en-US" dirty="0" err="1"/>
+              <a:rPr lang="en-US" sz="1400" dirty="0" err="1"/>
               <a:t>Nijs</a:t>
             </a:r>
             <a:r>
-              <a:rPr lang="en-US" dirty="0"/>
+              <a:rPr lang="en-US" sz="1400" dirty="0"/>
               <a:t>, M., </a:t>
             </a:r>
             <a:r>
-              <a:rPr lang="en-US" dirty="0" err="1"/>
+              <a:rPr lang="en-US" sz="1400" dirty="0" err="1"/>
               <a:t>Ojemann</a:t>
             </a:r>
             <a:r>
-              <a:rPr lang="en-US" dirty="0"/>
+              <a:rPr lang="en-US" sz="1400" dirty="0"/>
               <a:t>, J. G., &amp; Rao, R. P. N. (2010). Cortical activity during motor execution, motor imagery, and imagery-based online feedback. </a:t>
             </a:r>
             <a:r>
-              <a:rPr lang="en-US" i="1" dirty="0"/>
+              <a:rPr lang="en-US" sz="1400" i="1" dirty="0"/>
               <a:t>PNAS</a:t>
             </a:r>
             <a:r>
-              <a:rPr lang="en-US" dirty="0"/>
+              <a:rPr lang="en-US" sz="1400" dirty="0"/>
               <a:t>, </a:t>
             </a:r>
             <a:r>
-              <a:rPr lang="en-US" i="1" dirty="0"/>
+              <a:rPr lang="en-US" sz="1400" i="1" dirty="0"/>
               <a:t>107</a:t>
             </a:r>
             <a:r>
-              <a:rPr lang="en-US" dirty="0"/>
+              <a:rPr lang="en-US" sz="1400" dirty="0"/>
               <a:t>(9), 4430–4435.</a:t>
             </a:r>
           </a:p>
           <a:p>
-            <a:r>
-              <a:rPr lang="en-US" dirty="0"/>
+            <a:pPr>
+              <a:spcBef>
+                <a:spcPts val="400"/>
+              </a:spcBef>
+              <a:spcAft>
+                <a:spcPts val="400"/>
+              </a:spcAft>
+            </a:pPr>
+            <a:r>
+              <a:rPr lang="en-US" sz="1400" dirty="0"/>
               <a:t>Miller KJ. A library of human electrocorticographic data and analyses. </a:t>
             </a:r>
             <a:r>
-              <a:rPr lang="en-US" i="1" dirty="0"/>
+              <a:rPr lang="en-US" sz="1400" i="1" dirty="0"/>
               <a:t>Nat Hum </a:t>
             </a:r>
             <a:r>
-              <a:rPr lang="en-US" i="1" dirty="0" err="1"/>
+              <a:rPr lang="en-US" sz="1400" i="1" dirty="0" err="1"/>
               <a:t>Behav</a:t>
             </a:r>
             <a:r>
-              <a:rPr lang="en-US" dirty="0"/>
+              <a:rPr lang="en-US" sz="1400" dirty="0"/>
               <a:t>. 2019 Nov;3(11):1225-1235.</a:t>
             </a:r>
           </a:p>
           <a:p>
-            <a:r>
-              <a:rPr lang="en-US" dirty="0"/>
+            <a:pPr>
+              <a:spcBef>
+                <a:spcPts val="400"/>
+              </a:spcBef>
+              <a:spcAft>
+                <a:spcPts val="400"/>
+              </a:spcAft>
+            </a:pPr>
+            <a:r>
+              <a:rPr lang="en-US" sz="1400" dirty="0"/>
               <a:t>Unterweger, J., </a:t>
             </a:r>
             <a:r>
-              <a:rPr lang="en-US" dirty="0" err="1"/>
+              <a:rPr lang="en-US" sz="1400" dirty="0" err="1"/>
               <a:t>Seeber</a:t>
             </a:r>
             <a:r>
-              <a:rPr lang="en-US" dirty="0"/>
+              <a:rPr lang="en-US" sz="1400" dirty="0"/>
               <a:t>, M., </a:t>
             </a:r>
             <a:r>
-              <a:rPr lang="en-US" dirty="0" err="1"/>
+              <a:rPr lang="en-US" sz="1400" dirty="0" err="1"/>
               <a:t>Zanos</a:t>
             </a:r>
             <a:r>
-              <a:rPr lang="en-US" dirty="0"/>
+              <a:rPr lang="en-US" sz="1400" dirty="0"/>
               <a:t>, S., </a:t>
             </a:r>
             <a:r>
-              <a:rPr lang="en-US" dirty="0" err="1"/>
+              <a:rPr lang="en-US" sz="1400" dirty="0" err="1"/>
               <a:t>Ojemann</a:t>
             </a:r>
             <a:r>
-              <a:rPr lang="en-US" dirty="0"/>
+              <a:rPr lang="en-US" sz="1400" dirty="0"/>
               <a:t>, J. G., &amp; Scherer, R. (2020). </a:t>
             </a:r>
             <a:r>
-              <a:rPr lang="en-US" dirty="0" err="1"/>
+              <a:rPr lang="en-US" sz="1400" dirty="0" err="1"/>
               <a:t>ECoG</a:t>
             </a:r>
             <a:r>
-              <a:rPr lang="en-US" dirty="0"/>
+              <a:rPr lang="en-US" sz="1400" dirty="0"/>
               <a:t> Beta Suppression and Modulation During Finger Extension and Flexion. </a:t>
             </a:r>
             <a:r>
-              <a:rPr lang="en-US" i="1" dirty="0"/>
+              <a:rPr lang="en-US" sz="1400" i="1" dirty="0"/>
               <a:t>Frontiers in Neuroscience</a:t>
             </a:r>
             <a:r>
-              <a:rPr lang="en-US" dirty="0"/>
+              <a:rPr lang="en-US" sz="1400" dirty="0"/>
               <a:t>, </a:t>
             </a:r>
             <a:r>
-              <a:rPr lang="en-US" i="1" dirty="0"/>
+              <a:rPr lang="en-US" sz="1400" i="1" dirty="0"/>
               <a:t>14</a:t>
             </a:r>
             <a:r>
-              <a:rPr lang="en-US" dirty="0"/>
+              <a:rPr lang="en-US" sz="1400" dirty="0"/>
               <a:t>, 35.</a:t>
             </a:r>
           </a:p>
           <a:p>
-            <a:endParaRPr lang="en-US" dirty="0"/>
+            <a:pPr marL="0" indent="0">
+              <a:spcBef>
+                <a:spcPts val="400"/>
+              </a:spcBef>
+              <a:spcAft>
+                <a:spcPts val="400"/>
+              </a:spcAft>
+              <a:buNone/>
+            </a:pPr>
+            <a:endParaRPr lang="en-US" sz="1400" dirty="0"/>
+          </a:p>
+          <a:p>
+            <a:pPr>
+              <a:spcBef>
+                <a:spcPts val="400"/>
+              </a:spcBef>
+              <a:spcAft>
+                <a:spcPts val="400"/>
+              </a:spcAft>
+            </a:pPr>
+            <a:r>
+              <a:rPr lang="en-US" sz="1400" dirty="0"/>
+              <a:t>Code for creation of the GFP graphics based on the detailed example provided here:</a:t>
+            </a:r>
+            <a:br>
+              <a:rPr lang="en-US" sz="1400" dirty="0"/>
+            </a:br>
+            <a:r>
+              <a:rPr lang="en-US" sz="1400" dirty="0"/>
+              <a:t>https://</a:t>
+            </a:r>
+            <a:r>
+              <a:rPr lang="en-US" sz="1400" dirty="0" err="1"/>
+              <a:t>mne.tools</a:t>
+            </a:r>
+            <a:r>
+              <a:rPr lang="en-US" sz="1400" dirty="0"/>
+              <a:t>/stable/</a:t>
+            </a:r>
+            <a:r>
+              <a:rPr lang="en-US" sz="1400" dirty="0" err="1"/>
+              <a:t>auto_examples</a:t>
+            </a:r>
+            <a:r>
+              <a:rPr lang="en-US" sz="1400" dirty="0"/>
+              <a:t>/</a:t>
+            </a:r>
+            <a:r>
+              <a:rPr lang="en-US" sz="1400" dirty="0" err="1"/>
+              <a:t>time_frequency</a:t>
+            </a:r>
+            <a:r>
+              <a:rPr lang="en-US" sz="1400" dirty="0"/>
+              <a:t>/</a:t>
+            </a:r>
+            <a:r>
+              <a:rPr lang="en-US" sz="1400" dirty="0" err="1"/>
+              <a:t>time_frequency_global_field_power.html</a:t>
+            </a:r>
+            <a:endParaRPr lang="en-US" sz="1400" dirty="0"/>
           </a:p>
         </p:txBody>
       </p:sp>
@@ -5008,7 +5735,7 @@
 </p:sld>
 </file>
 
-<file path=ppt/slides/slide13.xml><?xml version="1.0" encoding="utf-8"?>
+<file path=ppt/slides/slide17.xml><?xml version="1.0" encoding="utf-8"?>
 <p:sld xmlns:a="http://schemas.openxmlformats.org/drawingml/2006/main" xmlns:r="http://schemas.openxmlformats.org/officeDocument/2006/relationships" xmlns:p="http://schemas.openxmlformats.org/presentationml/2006/main">
   <p:cSld>
     <p:spTree>
@@ -6292,7 +7019,7 @@
         </p:blipFill>
         <p:spPr>
           <a:xfrm>
-            <a:off x="4703107" y="3357021"/>
+            <a:off x="5882186" y="3080022"/>
             <a:ext cx="4863974" cy="2914599"/>
           </a:xfrm>
           <a:prstGeom prst="rect">
@@ -6314,7 +7041,7 @@
         </p:nvSpPr>
         <p:spPr>
           <a:xfrm>
-            <a:off x="9567081" y="5994621"/>
+            <a:off x="9482021" y="5994621"/>
             <a:ext cx="1414246" cy="276999"/>
           </a:xfrm>
           <a:prstGeom prst="rect">
@@ -6620,6 +7347,28 @@
               <a:t> within motor cortex during movement (event related desynchronization, ERD)</a:t>
             </a:r>
           </a:p>
+          <a:p>
+            <a:r>
+              <a:rPr lang="en-US" dirty="0"/>
+              <a:t>relative power in </a:t>
+            </a:r>
+            <a:r>
+              <a:rPr lang="en-US" b="1" dirty="0"/>
+              <a:t>high gamma </a:t>
+            </a:r>
+            <a:r>
+              <a:rPr lang="en-US" dirty="0"/>
+              <a:t>frequency </a:t>
+            </a:r>
+            <a:r>
+              <a:rPr lang="en-US" u="sng" dirty="0"/>
+              <a:t>increases</a:t>
+            </a:r>
+            <a:r>
+              <a:rPr lang="en-US" dirty="0"/>
+              <a:t> during movement (event related synchronization, ERS)</a:t>
+            </a:r>
+          </a:p>
         </p:txBody>
       </p:sp>
     </p:spTree>
@@ -6700,8 +7449,8 @@
         </p:nvSpPr>
         <p:spPr>
           <a:xfrm>
-            <a:off x="1272083" y="1571952"/>
-            <a:ext cx="4086118" cy="5120640"/>
+            <a:off x="1272082" y="1571952"/>
+            <a:ext cx="4404817" cy="5120640"/>
           </a:xfrm>
         </p:spPr>
         <p:txBody>
@@ -6712,7 +7461,7 @@
           <a:p>
             <a:r>
               <a:rPr lang="en-US" dirty="0"/>
-              <a:t>relative power </a:t>
+              <a:t>power </a:t>
             </a:r>
             <a:r>
               <a:rPr lang="en-US" u="sng" dirty="0"/>
@@ -6758,7 +7507,7 @@
         </p:blipFill>
         <p:spPr>
           <a:xfrm>
-            <a:off x="4052943" y="3599223"/>
+            <a:off x="5358201" y="3429000"/>
             <a:ext cx="5561716" cy="2329094"/>
           </a:xfrm>
           <a:prstGeom prst="rect">
@@ -6780,7 +7529,7 @@
         </p:nvSpPr>
         <p:spPr>
           <a:xfrm>
-            <a:off x="9614659" y="5678614"/>
+            <a:off x="3537568" y="5481095"/>
             <a:ext cx="1905693" cy="276999"/>
           </a:xfrm>
           <a:prstGeom prst="rect">
@@ -6875,10 +7624,15 @@
             <p:ph idx="1"/>
           </p:nvPr>
         </p:nvSpPr>
-        <p:spPr/>
+        <p:spPr>
+          <a:xfrm>
+            <a:off x="1498981" y="1751818"/>
+            <a:ext cx="8477532" cy="4519802"/>
+          </a:xfrm>
+        </p:spPr>
         <p:txBody>
           <a:bodyPr anchor="t">
-            <a:normAutofit lnSpcReduction="10000"/>
+            <a:normAutofit fontScale="85000" lnSpcReduction="20000"/>
           </a:bodyPr>
           <a:lstStyle/>
           <a:p>
@@ -6888,7 +7642,7 @@
             </a:pPr>
             <a:r>
               <a:rPr lang="en-US" dirty="0"/>
-              <a:t>Replicate prior ERD and MAM findings with the Miller dataset</a:t>
+              <a:t>Replicate prior ERD/ERS findings with the Miller dataset</a:t>
             </a:r>
           </a:p>
           <a:p>
@@ -6898,8 +7652,39 @@
             </a:pPr>
             <a:r>
               <a:rPr lang="en-US" dirty="0"/>
-              <a:t>Investigate how power modulations during imagined movement differ with prior findings in actual movements</a:t>
-            </a:r>
+              <a:t>Investigate how power profiles across frequency bands during </a:t>
+            </a:r>
+            <a:r>
+              <a:rPr lang="en-US" u="sng" dirty="0"/>
+              <a:t>imagined</a:t>
+            </a:r>
+            <a:r>
+              <a:rPr lang="en-US" dirty="0"/>
+              <a:t> movements differ from prior findings in </a:t>
+            </a:r>
+            <a:r>
+              <a:rPr lang="en-US" u="sng" dirty="0"/>
+              <a:t>actual</a:t>
+            </a:r>
+            <a:r>
+              <a:rPr lang="en-US" dirty="0"/>
+              <a:t> movements</a:t>
+            </a:r>
+          </a:p>
+          <a:p>
+            <a:pPr marL="457200" indent="-457200">
+              <a:buFont typeface="+mj-lt"/>
+              <a:buAutoNum type="arabicPeriod"/>
+            </a:pPr>
+            <a:r>
+              <a:rPr lang="en-US" dirty="0"/>
+              <a:t>Compare ability of XXXX classifier to identify actual and imagined movements when trained on beta only, gamma only, and </a:t>
+            </a:r>
+            <a:r>
+              <a:rPr lang="en-US" dirty="0" err="1"/>
+              <a:t>beta+gamma</a:t>
+            </a:r>
+            <a:endParaRPr lang="en-US" dirty="0"/>
           </a:p>
           <a:p>
             <a:pPr marL="457200" indent="-457200">
@@ -6934,7 +7719,17 @@
             </a:pPr>
             <a:r>
               <a:rPr lang="en-US" dirty="0"/>
-              <a:t>Attenuated MAM in high gamma frequency between actual and imagined</a:t>
+              <a:t>Attenuated changes in high gamma frequency for imagined movements in comparison with actual movements</a:t>
+            </a:r>
+          </a:p>
+          <a:p>
+            <a:pPr marL="457200" indent="-457200">
+              <a:buFont typeface="+mj-lt"/>
+              <a:buAutoNum type="alphaUcPeriod"/>
+            </a:pPr>
+            <a:r>
+              <a:rPr lang="en-US" dirty="0"/>
+              <a:t>Beta only models will significantly underperform in the discrimination task</a:t>
             </a:r>
           </a:p>
         </p:txBody>
@@ -7430,17 +8225,89 @@
             </a:br>
             <a:r>
               <a:rPr lang="en-US" sz="2400" dirty="0"/>
-              <a:t>S1 Hand</a:t>
+              <a:t>S1 Hand, Electrode 27</a:t>
+            </a:r>
+          </a:p>
+        </p:txBody>
+      </p:sp>
+      <p:sp>
+        <p:nvSpPr>
+          <p:cNvPr id="6" name="TextBox 5">
+            <a:extLst>
+              <a:ext uri="{FF2B5EF4-FFF2-40B4-BE49-F238E27FC236}">
+                <a16:creationId xmlns:a16="http://schemas.microsoft.com/office/drawing/2014/main" id="{398FD5B5-967C-0842-9C32-2FF021B335AF}"/>
+              </a:ext>
+            </a:extLst>
+          </p:cNvPr>
+          <p:cNvSpPr txBox="1"/>
+          <p:nvPr/>
+        </p:nvSpPr>
+        <p:spPr>
+          <a:xfrm>
+            <a:off x="1708727" y="1898073"/>
+            <a:ext cx="4193309" cy="369332"/>
+          </a:xfrm>
+          <a:prstGeom prst="rect">
+            <a:avLst/>
+          </a:prstGeom>
+          <a:noFill/>
+        </p:spPr>
+        <p:txBody>
+          <a:bodyPr wrap="square" rtlCol="0">
+            <a:spAutoFit/>
+          </a:bodyPr>
+          <a:lstStyle/>
+          <a:p>
+            <a:pPr algn="ctr"/>
+            <a:r>
+              <a:rPr lang="en-US" u="sng" dirty="0"/>
+              <a:t>actual movement</a:t>
+            </a:r>
+          </a:p>
+        </p:txBody>
+      </p:sp>
+      <p:sp>
+        <p:nvSpPr>
+          <p:cNvPr id="7" name="TextBox 6">
+            <a:extLst>
+              <a:ext uri="{FF2B5EF4-FFF2-40B4-BE49-F238E27FC236}">
+                <a16:creationId xmlns:a16="http://schemas.microsoft.com/office/drawing/2014/main" id="{491C672F-5F1C-145B-D2AA-0489F3EE2464}"/>
+              </a:ext>
+            </a:extLst>
+          </p:cNvPr>
+          <p:cNvSpPr txBox="1"/>
+          <p:nvPr/>
+        </p:nvSpPr>
+        <p:spPr>
+          <a:xfrm>
+            <a:off x="6696363" y="1898073"/>
+            <a:ext cx="4193309" cy="369332"/>
+          </a:xfrm>
+          <a:prstGeom prst="rect">
+            <a:avLst/>
+          </a:prstGeom>
+          <a:noFill/>
+        </p:spPr>
+        <p:txBody>
+          <a:bodyPr wrap="square" rtlCol="0">
+            <a:spAutoFit/>
+          </a:bodyPr>
+          <a:lstStyle/>
+          <a:p>
+            <a:pPr algn="ctr"/>
+            <a:r>
+              <a:rPr lang="en-US" u="sng" dirty="0"/>
+              <a:t>imagined movement</a:t>
             </a:r>
           </a:p>
         </p:txBody>
       </p:sp>
       <p:pic>
         <p:nvPicPr>
-          <p:cNvPr id="5" name="Picture 4">
+          <p:cNvPr id="3" name="Picture 2">
             <a:extLst>
               <a:ext uri="{FF2B5EF4-FFF2-40B4-BE49-F238E27FC236}">
-                <a16:creationId xmlns:a16="http://schemas.microsoft.com/office/drawing/2014/main" id="{C05A4A0E-1861-6CA0-3055-988CB5C291EE}"/>
+                <a16:creationId xmlns:a16="http://schemas.microsoft.com/office/drawing/2014/main" id="{7968E5F1-2B9E-2564-DCE2-DDCBF99A481B}"/>
               </a:ext>
             </a:extLst>
           </p:cNvPr>
@@ -7457,128 +8324,20 @@
         </p:blipFill>
         <p:spPr>
           <a:xfrm>
-            <a:off x="1829840" y="2559173"/>
-            <a:ext cx="3951082" cy="2648527"/>
+            <a:off x="1708727" y="2566729"/>
+            <a:ext cx="4357481" cy="2923373"/>
           </a:xfrm>
           <a:prstGeom prst="rect">
             <a:avLst/>
           </a:prstGeom>
         </p:spPr>
       </p:pic>
-      <p:sp>
-        <p:nvSpPr>
-          <p:cNvPr id="6" name="TextBox 5">
+      <p:pic>
+        <p:nvPicPr>
+          <p:cNvPr id="4" name="Picture 3">
             <a:extLst>
               <a:ext uri="{FF2B5EF4-FFF2-40B4-BE49-F238E27FC236}">
-                <a16:creationId xmlns:a16="http://schemas.microsoft.com/office/drawing/2014/main" id="{398FD5B5-967C-0842-9C32-2FF021B335AF}"/>
-              </a:ext>
-            </a:extLst>
-          </p:cNvPr>
-          <p:cNvSpPr txBox="1"/>
-          <p:nvPr/>
-        </p:nvSpPr>
-        <p:spPr>
-          <a:xfrm>
-            <a:off x="1708727" y="1898073"/>
-            <a:ext cx="4193309" cy="369332"/>
-          </a:xfrm>
-          <a:prstGeom prst="rect">
-            <a:avLst/>
-          </a:prstGeom>
-          <a:noFill/>
-        </p:spPr>
-        <p:txBody>
-          <a:bodyPr wrap="square" rtlCol="0">
-            <a:spAutoFit/>
-          </a:bodyPr>
-          <a:lstStyle/>
-          <a:p>
-            <a:pPr algn="ctr"/>
-            <a:r>
-              <a:rPr lang="en-US" u="sng" dirty="0"/>
-              <a:t>actual movement</a:t>
-            </a:r>
-          </a:p>
-        </p:txBody>
-      </p:sp>
-      <p:sp>
-        <p:nvSpPr>
-          <p:cNvPr id="7" name="TextBox 6">
-            <a:extLst>
-              <a:ext uri="{FF2B5EF4-FFF2-40B4-BE49-F238E27FC236}">
-                <a16:creationId xmlns:a16="http://schemas.microsoft.com/office/drawing/2014/main" id="{491C672F-5F1C-145B-D2AA-0489F3EE2464}"/>
-              </a:ext>
-            </a:extLst>
-          </p:cNvPr>
-          <p:cNvSpPr txBox="1"/>
-          <p:nvPr/>
-        </p:nvSpPr>
-        <p:spPr>
-          <a:xfrm>
-            <a:off x="6696363" y="1898073"/>
-            <a:ext cx="4193309" cy="369332"/>
-          </a:xfrm>
-          <a:prstGeom prst="rect">
-            <a:avLst/>
-          </a:prstGeom>
-          <a:noFill/>
-        </p:spPr>
-        <p:txBody>
-          <a:bodyPr wrap="square" rtlCol="0">
-            <a:spAutoFit/>
-          </a:bodyPr>
-          <a:lstStyle/>
-          <a:p>
-            <a:pPr algn="ctr"/>
-            <a:r>
-              <a:rPr lang="en-US" u="sng" dirty="0"/>
-              <a:t>imagined movement</a:t>
-            </a:r>
-          </a:p>
-        </p:txBody>
-      </p:sp>
-      <p:sp>
-        <p:nvSpPr>
-          <p:cNvPr id="8" name="TextBox 7">
-            <a:extLst>
-              <a:ext uri="{FF2B5EF4-FFF2-40B4-BE49-F238E27FC236}">
-                <a16:creationId xmlns:a16="http://schemas.microsoft.com/office/drawing/2014/main" id="{C0683A5F-159B-0C16-795B-47AE26B58808}"/>
-              </a:ext>
-            </a:extLst>
-          </p:cNvPr>
-          <p:cNvSpPr txBox="1"/>
-          <p:nvPr/>
-        </p:nvSpPr>
-        <p:spPr>
-          <a:xfrm>
-            <a:off x="3613744" y="6093898"/>
-            <a:ext cx="5179273" cy="369332"/>
-          </a:xfrm>
-          <a:prstGeom prst="rect">
-            <a:avLst/>
-          </a:prstGeom>
-          <a:noFill/>
-        </p:spPr>
-        <p:txBody>
-          <a:bodyPr wrap="square" rtlCol="0">
-            <a:spAutoFit/>
-          </a:bodyPr>
-          <a:lstStyle/>
-          <a:p>
-            <a:pPr algn="ctr"/>
-            <a:r>
-              <a:rPr lang="en-US" dirty="0"/>
-              <a:t>add slides: S4 hand, S1 tongue, S3 tongue</a:t>
-            </a:r>
-          </a:p>
-        </p:txBody>
-      </p:sp>
-      <p:pic>
-        <p:nvPicPr>
-          <p:cNvPr id="9" name="Picture 8">
-            <a:extLst>
-              <a:ext uri="{FF2B5EF4-FFF2-40B4-BE49-F238E27FC236}">
-                <a16:creationId xmlns:a16="http://schemas.microsoft.com/office/drawing/2014/main" id="{F35620BC-A0DC-E7FE-B03E-C329F9ED1785}"/>
+                <a16:creationId xmlns:a16="http://schemas.microsoft.com/office/drawing/2014/main" id="{D64F9AB2-9563-2816-F34F-F4B0AF056AE5}"/>
               </a:ext>
             </a:extLst>
           </p:cNvPr>
@@ -7588,63 +8347,21 @@
           <p:nvPr/>
         </p:nvPicPr>
         <p:blipFill>
-          <a:blip r:embed="rId2"/>
+          <a:blip r:embed="rId3"/>
           <a:stretch>
             <a:fillRect/>
           </a:stretch>
         </p:blipFill>
         <p:spPr>
           <a:xfrm>
-            <a:off x="6696363" y="2656982"/>
-            <a:ext cx="3951082" cy="2648527"/>
+            <a:off x="6612259" y="2566729"/>
+            <a:ext cx="4361515" cy="2926080"/>
           </a:xfrm>
           <a:prstGeom prst="rect">
             <a:avLst/>
           </a:prstGeom>
         </p:spPr>
       </p:pic>
-      <p:sp>
-        <p:nvSpPr>
-          <p:cNvPr id="10" name="TextBox 9">
-            <a:extLst>
-              <a:ext uri="{FF2B5EF4-FFF2-40B4-BE49-F238E27FC236}">
-                <a16:creationId xmlns:a16="http://schemas.microsoft.com/office/drawing/2014/main" id="{BDFD5389-D7A7-2EC6-5234-5AE362F8CA13}"/>
-              </a:ext>
-            </a:extLst>
-          </p:cNvPr>
-          <p:cNvSpPr txBox="1"/>
-          <p:nvPr/>
-        </p:nvSpPr>
-        <p:spPr>
-          <a:xfrm rot="19966124">
-            <a:off x="2197611" y="2969708"/>
-            <a:ext cx="7465326" cy="1446550"/>
-          </a:xfrm>
-          <a:prstGeom prst="rect">
-            <a:avLst/>
-          </a:prstGeom>
-          <a:noFill/>
-        </p:spPr>
-        <p:txBody>
-          <a:bodyPr wrap="square" rtlCol="0">
-            <a:spAutoFit/>
-          </a:bodyPr>
-          <a:lstStyle/>
-          <a:p>
-            <a:pPr algn="ctr"/>
-            <a:r>
-              <a:rPr lang="en-US" sz="8800" dirty="0">
-                <a:solidFill>
-                  <a:schemeClr val="tx1">
-                    <a:lumMod val="50000"/>
-                  </a:schemeClr>
-                </a:solidFill>
-              </a:rPr>
-              <a:t>to be updated</a:t>
-            </a:r>
-          </a:p>
-        </p:txBody>
-      </p:sp>
     </p:spTree>
     <p:extLst>
       <p:ext uri="{BB962C8B-B14F-4D97-AF65-F5344CB8AC3E}">
@@ -7698,14 +8415,14 @@
           <a:p>
             <a:r>
               <a:rPr lang="en-US" dirty="0"/>
-              <a:t>Results | MAM</a:t>
+              <a:t>Results | ERD</a:t>
             </a:r>
             <a:br>
               <a:rPr lang="en-US" dirty="0"/>
             </a:br>
             <a:r>
               <a:rPr lang="en-US" sz="2400" dirty="0"/>
-              <a:t>S1 Hand</a:t>
+              <a:t>S1 Hand, Electrode 35</a:t>
             </a:r>
           </a:p>
         </p:txBody>
@@ -7782,55 +8499,12 @@
           </a:p>
         </p:txBody>
       </p:sp>
-      <p:sp>
-        <p:nvSpPr>
-          <p:cNvPr id="8" name="TextBox 7">
+      <p:pic>
+        <p:nvPicPr>
+          <p:cNvPr id="5" name="Picture 4">
             <a:extLst>
               <a:ext uri="{FF2B5EF4-FFF2-40B4-BE49-F238E27FC236}">
-                <a16:creationId xmlns:a16="http://schemas.microsoft.com/office/drawing/2014/main" id="{C0683A5F-159B-0C16-795B-47AE26B58808}"/>
-              </a:ext>
-            </a:extLst>
-          </p:cNvPr>
-          <p:cNvSpPr txBox="1"/>
-          <p:nvPr/>
-        </p:nvSpPr>
-        <p:spPr>
-          <a:xfrm>
-            <a:off x="1937982" y="6103265"/>
-            <a:ext cx="7847463" cy="646331"/>
-          </a:xfrm>
-          <a:prstGeom prst="rect">
-            <a:avLst/>
-          </a:prstGeom>
-          <a:noFill/>
-        </p:spPr>
-        <p:txBody>
-          <a:bodyPr wrap="square" rtlCol="0">
-            <a:spAutoFit/>
-          </a:bodyPr>
-          <a:lstStyle/>
-          <a:p>
-            <a:pPr algn="ctr"/>
-            <a:r>
-              <a:rPr lang="en-US" dirty="0"/>
-              <a:t>add slides: S4 hand, S1 tongue, S3 tongue</a:t>
-            </a:r>
-          </a:p>
-          <a:p>
-            <a:pPr algn="ctr"/>
-            <a:r>
-              <a:rPr lang="en-US" dirty="0"/>
-              <a:t>maybe better way to compare between actual and imagined?</a:t>
-            </a:r>
-          </a:p>
-        </p:txBody>
-      </p:sp>
-      <p:pic>
-        <p:nvPicPr>
-          <p:cNvPr id="3" name="Picture 2">
-            <a:extLst>
-              <a:ext uri="{FF2B5EF4-FFF2-40B4-BE49-F238E27FC236}">
-                <a16:creationId xmlns:a16="http://schemas.microsoft.com/office/drawing/2014/main" id="{34AA3763-A7A1-6DC0-ECDE-B84967C9F58D}"/>
+                <a16:creationId xmlns:a16="http://schemas.microsoft.com/office/drawing/2014/main" id="{3A76629F-6595-4D55-1F45-69F3ABF73D5C}"/>
               </a:ext>
             </a:extLst>
           </p:cNvPr>
@@ -7847,8 +8521,8 @@
         </p:blipFill>
         <p:spPr>
           <a:xfrm>
-            <a:off x="1708727" y="2504552"/>
-            <a:ext cx="4350982" cy="2849191"/>
+            <a:off x="1708727" y="2566729"/>
+            <a:ext cx="4416725" cy="2926080"/>
           </a:xfrm>
           <a:prstGeom prst="rect">
             <a:avLst/>
@@ -7857,10 +8531,10 @@
       </p:pic>
       <p:pic>
         <p:nvPicPr>
-          <p:cNvPr id="4" name="Picture 3">
+          <p:cNvPr id="8" name="Picture 7">
             <a:extLst>
               <a:ext uri="{FF2B5EF4-FFF2-40B4-BE49-F238E27FC236}">
-                <a16:creationId xmlns:a16="http://schemas.microsoft.com/office/drawing/2014/main" id="{C83DABD9-7B4F-5744-09A9-8CAB0817548E}"/>
+                <a16:creationId xmlns:a16="http://schemas.microsoft.com/office/drawing/2014/main" id="{50B4234D-3E81-BD8D-05AA-A0399F8A82E2}"/>
               </a:ext>
             </a:extLst>
           </p:cNvPr>
@@ -7870,67 +8544,25 @@
           <p:nvPr/>
         </p:nvPicPr>
         <p:blipFill>
-          <a:blip r:embed="rId2"/>
+          <a:blip r:embed="rId3"/>
           <a:stretch>
             <a:fillRect/>
           </a:stretch>
         </p:blipFill>
         <p:spPr>
           <a:xfrm>
-            <a:off x="6590973" y="2504552"/>
-            <a:ext cx="4350982" cy="2849191"/>
+            <a:off x="6536743" y="2566729"/>
+            <a:ext cx="4416724" cy="2926080"/>
           </a:xfrm>
           <a:prstGeom prst="rect">
             <a:avLst/>
           </a:prstGeom>
         </p:spPr>
       </p:pic>
-      <p:sp>
-        <p:nvSpPr>
-          <p:cNvPr id="10" name="TextBox 9">
-            <a:extLst>
-              <a:ext uri="{FF2B5EF4-FFF2-40B4-BE49-F238E27FC236}">
-                <a16:creationId xmlns:a16="http://schemas.microsoft.com/office/drawing/2014/main" id="{796DAEED-5189-AAC2-01A9-4E898DB176E3}"/>
-              </a:ext>
-            </a:extLst>
-          </p:cNvPr>
-          <p:cNvSpPr txBox="1"/>
-          <p:nvPr/>
-        </p:nvSpPr>
-        <p:spPr>
-          <a:xfrm rot="19966124">
-            <a:off x="2197611" y="2969708"/>
-            <a:ext cx="7465326" cy="1446550"/>
-          </a:xfrm>
-          <a:prstGeom prst="rect">
-            <a:avLst/>
-          </a:prstGeom>
-          <a:noFill/>
-        </p:spPr>
-        <p:txBody>
-          <a:bodyPr wrap="square" rtlCol="0">
-            <a:spAutoFit/>
-          </a:bodyPr>
-          <a:lstStyle/>
-          <a:p>
-            <a:pPr algn="ctr"/>
-            <a:r>
-              <a:rPr lang="en-US" sz="8800" dirty="0">
-                <a:solidFill>
-                  <a:schemeClr val="tx1">
-                    <a:lumMod val="50000"/>
-                  </a:schemeClr>
-                </a:solidFill>
-              </a:rPr>
-              <a:t>to be updated</a:t>
-            </a:r>
-          </a:p>
-        </p:txBody>
-      </p:sp>
     </p:spTree>
     <p:extLst>
       <p:ext uri="{BB962C8B-B14F-4D97-AF65-F5344CB8AC3E}">
-        <p14:creationId xmlns:p14="http://schemas.microsoft.com/office/powerpoint/2010/main" val="183727650"/>
+        <p14:creationId xmlns:p14="http://schemas.microsoft.com/office/powerpoint/2010/main" val="2973634916"/>
       </p:ext>
     </p:extLst>
   </p:cSld>

</xml_diff>